<commit_message>
Added a debug output.
Former-commit-id: 217b2a8249034f25bce18024f7e6234b65a4e72b
</commit_message>
<xml_diff>
--- a/documents/mono_sample_det_pos.pptx
+++ b/documents/mono_sample_det_pos.pptx
@@ -125,7 +125,38 @@
       </a:defRPr>
     </a:lvl9pPr>
   </p:defaultTextStyle>
+  <p:extLst>
+    <p:ext uri="{EFAFB233-063F-42B5-8137-9DF3F51BA10A}">
+      <p15:sldGuideLst xmlns:p15="http://schemas.microsoft.com/office/powerpoint/2012/main"/>
+    </p:ext>
+  </p:extLst>
 </p:presentation>
+</file>
+
+<file path=ppt/commentAuthors.xml><?xml version="1.0" encoding="utf-8"?>
+<p:cmAuthorLst xmlns:a="http://schemas.openxmlformats.org/drawingml/2006/main" xmlns:r="http://schemas.openxmlformats.org/officeDocument/2006/relationships" xmlns:p="http://schemas.openxmlformats.org/presentationml/2006/main">
+  <p:cmAuthor id="1" name="Urban, Volker S." initials="UVS" lastIdx="1" clrIdx="0">
+    <p:extLst>
+      <p:ext uri="{19B8F6BF-5375-455C-9EA6-DF929625EA0E}">
+        <p15:presenceInfo xmlns:p15="http://schemas.microsoft.com/office/powerpoint/2012/main" userId="S::ur9@ornl.gov::2b266d09-2c60-4008-bb94-bd572f59f200" providerId="AD"/>
+      </p:ext>
+    </p:extLst>
+  </p:cmAuthor>
+</p:cmAuthorLst>
+</file>
+
+<file path=ppt/comments/comment1.xml><?xml version="1.0" encoding="utf-8"?>
+<p:cmLst xmlns:a="http://schemas.openxmlformats.org/drawingml/2006/main" xmlns:r="http://schemas.openxmlformats.org/officeDocument/2006/relationships" xmlns:p="http://schemas.openxmlformats.org/presentationml/2006/main">
+  <p:cm authorId="1" dt="2020-03-18T09:08:31.664" idx="1">
+    <p:pos x="4587" y="3532"/>
+    <p:text>I think this should be +0.071</p:text>
+    <p:extLst>
+      <p:ext uri="{C676402C-5697-4E1C-873F-D02D1690AC5C}">
+        <p15:threadingInfo xmlns:p15="http://schemas.microsoft.com/office/powerpoint/2012/main" timeZoneBias="240"/>
+      </p:ext>
+    </p:extLst>
+  </p:cm>
+</p:cmLst>
 </file>
 
 <file path=ppt/slideLayouts/slideLayout1.xml><?xml version="1.0" encoding="utf-8"?>
@@ -275,7 +306,7 @@
           <a:p>
             <a:fld id="{00FDB746-4D1D-4E4B-A61E-889245F811D5}" type="datetimeFigureOut">
               <a:rPr lang="en-US" smtClean="0"/>
-              <a:t>3/16/20</a:t>
+              <a:t>3/18/20</a:t>
             </a:fld>
             <a:endParaRPr lang="en-US"/>
           </a:p>
@@ -473,7 +504,7 @@
           <a:p>
             <a:fld id="{00FDB746-4D1D-4E4B-A61E-889245F811D5}" type="datetimeFigureOut">
               <a:rPr lang="en-US" smtClean="0"/>
-              <a:t>3/16/20</a:t>
+              <a:t>3/18/20</a:t>
             </a:fld>
             <a:endParaRPr lang="en-US"/>
           </a:p>
@@ -681,7 +712,7 @@
           <a:p>
             <a:fld id="{00FDB746-4D1D-4E4B-A61E-889245F811D5}" type="datetimeFigureOut">
               <a:rPr lang="en-US" smtClean="0"/>
-              <a:t>3/16/20</a:t>
+              <a:t>3/18/20</a:t>
             </a:fld>
             <a:endParaRPr lang="en-US"/>
           </a:p>
@@ -879,7 +910,7 @@
           <a:p>
             <a:fld id="{00FDB746-4D1D-4E4B-A61E-889245F811D5}" type="datetimeFigureOut">
               <a:rPr lang="en-US" smtClean="0"/>
-              <a:t>3/16/20</a:t>
+              <a:t>3/18/20</a:t>
             </a:fld>
             <a:endParaRPr lang="en-US"/>
           </a:p>
@@ -1154,7 +1185,7 @@
           <a:p>
             <a:fld id="{00FDB746-4D1D-4E4B-A61E-889245F811D5}" type="datetimeFigureOut">
               <a:rPr lang="en-US" smtClean="0"/>
-              <a:t>3/16/20</a:t>
+              <a:t>3/18/20</a:t>
             </a:fld>
             <a:endParaRPr lang="en-US"/>
           </a:p>
@@ -1419,7 +1450,7 @@
           <a:p>
             <a:fld id="{00FDB746-4D1D-4E4B-A61E-889245F811D5}" type="datetimeFigureOut">
               <a:rPr lang="en-US" smtClean="0"/>
-              <a:t>3/16/20</a:t>
+              <a:t>3/18/20</a:t>
             </a:fld>
             <a:endParaRPr lang="en-US"/>
           </a:p>
@@ -1831,7 +1862,7 @@
           <a:p>
             <a:fld id="{00FDB746-4D1D-4E4B-A61E-889245F811D5}" type="datetimeFigureOut">
               <a:rPr lang="en-US" smtClean="0"/>
-              <a:t>3/16/20</a:t>
+              <a:t>3/18/20</a:t>
             </a:fld>
             <a:endParaRPr lang="en-US"/>
           </a:p>
@@ -1972,7 +2003,7 @@
           <a:p>
             <a:fld id="{00FDB746-4D1D-4E4B-A61E-889245F811D5}" type="datetimeFigureOut">
               <a:rPr lang="en-US" smtClean="0"/>
-              <a:t>3/16/20</a:t>
+              <a:t>3/18/20</a:t>
             </a:fld>
             <a:endParaRPr lang="en-US"/>
           </a:p>
@@ -2085,7 +2116,7 @@
           <a:p>
             <a:fld id="{00FDB746-4D1D-4E4B-A61E-889245F811D5}" type="datetimeFigureOut">
               <a:rPr lang="en-US" smtClean="0"/>
-              <a:t>3/16/20</a:t>
+              <a:t>3/18/20</a:t>
             </a:fld>
             <a:endParaRPr lang="en-US"/>
           </a:p>
@@ -2396,7 +2427,7 @@
           <a:p>
             <a:fld id="{00FDB746-4D1D-4E4B-A61E-889245F811D5}" type="datetimeFigureOut">
               <a:rPr lang="en-US" smtClean="0"/>
-              <a:t>3/16/20</a:t>
+              <a:t>3/18/20</a:t>
             </a:fld>
             <a:endParaRPr lang="en-US"/>
           </a:p>
@@ -2684,7 +2715,7 @@
           <a:p>
             <a:fld id="{00FDB746-4D1D-4E4B-A61E-889245F811D5}" type="datetimeFigureOut">
               <a:rPr lang="en-US" smtClean="0"/>
-              <a:t>3/16/20</a:t>
+              <a:t>3/18/20</a:t>
             </a:fld>
             <a:endParaRPr lang="en-US"/>
           </a:p>
@@ -2925,7 +2956,7 @@
           <a:p>
             <a:fld id="{00FDB746-4D1D-4E4B-A61E-889245F811D5}" type="datetimeFigureOut">
               <a:rPr lang="en-US" smtClean="0"/>
-              <a:t>3/16/20</a:t>
+              <a:t>3/18/20</a:t>
             </a:fld>
             <a:endParaRPr lang="en-US"/>
           </a:p>
@@ -4813,6 +4844,21 @@
           <a:p>
             <a:pPr lvl="1"/>
             <a:r>
+              <a:rPr lang="en-US" dirty="0">
+                <a:solidFill>
+                  <a:srgbClr val="FF0000"/>
+                </a:solidFill>
+              </a:rPr>
+              <a:t>Wing detector CANNOT be moved in z-direction </a:t>
+            </a:r>
+            <a:r>
+              <a:rPr lang="en-US" dirty="0"/>
+              <a:t>[but on arc]</a:t>
+            </a:r>
+          </a:p>
+          <a:p>
+            <a:pPr lvl="1"/>
+            <a:r>
               <a:rPr lang="en-US" dirty="0"/>
               <a:t>Source can be moved</a:t>
             </a:r>
@@ -4821,7 +4867,7 @@
             <a:pPr lvl="1"/>
             <a:r>
               <a:rPr lang="en-US" dirty="0"/>
-              <a:t>Silicon window CANNOT be moved and fixed at 71mm from nominal position (original) along neutron beam’s direction.  Thus its position is (0, 0, -0.071) meter.</a:t>
+              <a:t>Silicon window CANNOT be moved and fixed at 71mm from nominal position (original) along neutron beam’s direction.  Thus its position is (0, 0, 0.071) meter.</a:t>
             </a:r>
           </a:p>
         </p:txBody>
@@ -4951,14 +4997,14 @@
           <p:nvPr>
             <p:extLst>
               <p:ext uri="{D42A27DB-BD31-4B8C-83A1-F6EECF244321}">
-                <p14:modId xmlns:p14="http://schemas.microsoft.com/office/powerpoint/2010/main" val="1030171044"/>
+                <p14:modId xmlns:p14="http://schemas.microsoft.com/office/powerpoint/2010/main" val="2464049274"/>
               </p:ext>
             </p:extLst>
           </p:nvPr>
         </p:nvGraphicFramePr>
         <p:xfrm>
           <a:off x="1062736" y="2782252"/>
-          <a:ext cx="9916161" cy="1293495"/>
+          <a:ext cx="9916161" cy="1502410"/>
         </p:xfrm>
         <a:graphic>
           <a:graphicData uri="http://schemas.openxmlformats.org/drawingml/2006/table">
@@ -4974,14 +5020,21 @@
                     </a:ext>
                   </a:extLst>
                 </a:gridCol>
-                <a:gridCol w="2936918">
+                <a:gridCol w="2149238">
                   <a:extLst>
                     <a:ext uri="{9D8B030D-6E8A-4147-A177-3AD203B41FA5}">
                       <a16:colId xmlns:a16="http://schemas.microsoft.com/office/drawing/2014/main" val="1071561824"/>
                     </a:ext>
                   </a:extLst>
                 </a:gridCol>
-                <a:gridCol w="3305387">
+                <a:gridCol w="1510747">
+                  <a:extLst>
+                    <a:ext uri="{9D8B030D-6E8A-4147-A177-3AD203B41FA5}">
+                      <a16:colId xmlns:a16="http://schemas.microsoft.com/office/drawing/2014/main" val="1872667007"/>
+                    </a:ext>
+                  </a:extLst>
+                </a:gridCol>
+                <a:gridCol w="2582320">
                   <a:extLst>
                     <a:ext uri="{9D8B030D-6E8A-4147-A177-3AD203B41FA5}">
                       <a16:colId xmlns:a16="http://schemas.microsoft.com/office/drawing/2014/main" val="2094454854"/>
@@ -5011,6 +5064,19 @@
                       <a:r>
                         <a:rPr lang="en-US" dirty="0"/>
                         <a:t>EPICS</a:t>
+                      </a:r>
+                    </a:p>
+                  </a:txBody>
+                  <a:tcPr/>
+                </a:tc>
+                <a:tc>
+                  <a:txBody>
+                    <a:bodyPr/>
+                    <a:lstStyle/>
+                    <a:p>
+                      <a:r>
+                        <a:rPr lang="en-US" dirty="0"/>
+                        <a:t>JSON</a:t>
                       </a:r>
                     </a:p>
                   </a:txBody>
@@ -5053,7 +5119,7 @@
                   </a:txBody>
                   <a:tcPr/>
                 </a:tc>
-                <a:tc>
+                <a:tc gridSpan="2">
                   <a:txBody>
                     <a:bodyPr/>
                     <a:lstStyle/>
@@ -5063,6 +5129,16 @@
                         <a:t>SampleToSi</a:t>
                       </a:r>
                       <a:endParaRPr lang="en-US" dirty="0"/>
+                    </a:p>
+                  </a:txBody>
+                  <a:tcPr/>
+                </a:tc>
+                <a:tc hMerge="1">
+                  <a:txBody>
+                    <a:bodyPr/>
+                    <a:lstStyle/>
+                    <a:p>
+                      <a:endParaRPr lang="en-US"/>
                     </a:p>
                   </a:txBody>
                   <a:tcPr/>
@@ -5101,7 +5177,7 @@
                   </a:txBody>
                   <a:tcPr/>
                 </a:tc>
-                <a:tc>
+                <a:tc gridSpan="2">
                   <a:txBody>
                     <a:bodyPr/>
                     <a:lstStyle/>
@@ -5115,6 +5191,16 @@
                   </a:txBody>
                   <a:tcPr/>
                 </a:tc>
+                <a:tc hMerge="1">
+                  <a:txBody>
+                    <a:bodyPr/>
+                    <a:lstStyle/>
+                    <a:p>
+                      <a:endParaRPr lang="en-US"/>
+                    </a:p>
+                  </a:txBody>
+                  <a:tcPr/>
+                </a:tc>
                 <a:tc>
                   <a:txBody>
                     <a:bodyPr/>
@@ -5122,9 +5208,20 @@
                     <a:p>
                       <a:r>
                         <a:rPr lang="en-US" dirty="0" err="1"/>
+                        <a:t>sample_detector_distance</a:t>
+                      </a:r>
+                      <a:r>
+                        <a:rPr lang="en-US" dirty="0"/>
+                        <a:t> (</a:t>
+                      </a:r>
+                      <a:r>
+                        <a:rPr lang="en-US" dirty="0" err="1"/>
                         <a:t>sdd</a:t>
                       </a:r>
-                      <a:endParaRPr lang="en-US" dirty="0"/>
+                      <a:r>
+                        <a:rPr lang="en-US" dirty="0"/>
+                        <a:t>)</a:t>
+                      </a:r>
                     </a:p>
                   </a:txBody>
                   <a:tcPr/>
@@ -6150,7 +6247,7 @@
                   <a:schemeClr val="accent6"/>
                 </a:solidFill>
               </a:rPr>
-              <a:t> – 0.071 )</a:t>
+              <a:t> – 0.071)</a:t>
             </a:r>
             <a:br>
               <a:rPr lang="en-US" sz="1400" dirty="0">
@@ -6282,8 +6379,8 @@
         </p:nvSpPr>
         <p:spPr>
           <a:xfrm>
-            <a:off x="8382663" y="2951441"/>
-            <a:ext cx="2368527" cy="523220"/>
+            <a:off x="7030101" y="2951441"/>
+            <a:ext cx="3721090" cy="523220"/>
           </a:xfrm>
           <a:prstGeom prst="rect">
             <a:avLst/>
@@ -6309,7 +6406,7 @@
                   <a:schemeClr val="accent6"/>
                 </a:solidFill>
               </a:rPr>
-              <a:t>sdd</a:t>
+              <a:t>sample_detector_distance</a:t>
             </a:r>
             <a:r>
               <a:rPr lang="en-US" sz="1400" dirty="0">
@@ -6442,7 +6539,7 @@
             </a:pPr>
             <a:r>
               <a:rPr lang="en-US" dirty="0"/>
-              <a:t>Center of silicon window is at (0, 0, -0.071) (unit is meter), </a:t>
+              <a:t>Center of silicon window is at (0, 0, 0.071) (unit is meter), </a:t>
             </a:r>
             <a:r>
               <a:rPr lang="en-US" dirty="0" err="1"/>
@@ -7544,8 +7641,8 @@
         </p:nvSpPr>
         <p:spPr>
           <a:xfrm>
-            <a:off x="990828" y="5047545"/>
-            <a:ext cx="9094797" cy="1477328"/>
+            <a:off x="520450" y="4687715"/>
+            <a:ext cx="9636612" cy="2031325"/>
           </a:xfrm>
           <a:prstGeom prst="rect">
             <a:avLst/>
@@ -7572,6 +7669,20 @@
               <a:buAutoNum type="arabicPeriod"/>
             </a:pPr>
             <a:r>
+              <a:rPr lang="en-US" b="1" dirty="0">
+                <a:solidFill>
+                  <a:schemeClr val="accent6"/>
+                </a:solidFill>
+              </a:rPr>
+              <a:t>Move sample and detector positions</a:t>
+            </a:r>
+          </a:p>
+          <a:p>
+            <a:pPr marL="800100" lvl="1" indent="-342900">
+              <a:buFont typeface="Arial" panose="020B0604020202020204" pitchFamily="34" charset="0"/>
+              <a:buChar char="•"/>
+            </a:pPr>
+            <a:r>
               <a:rPr lang="en-US" dirty="0">
                 <a:solidFill>
                   <a:schemeClr val="accent6"/>
@@ -7635,82 +7746,101 @@
               </a:rPr>
               <a:t>) </a:t>
             </a:r>
+          </a:p>
+          <a:p>
+            <a:pPr marL="800100" lvl="1" indent="-342900">
+              <a:buFont typeface="Arial" panose="020B0604020202020204" pitchFamily="34" charset="0"/>
+              <a:buChar char="•"/>
+            </a:pPr>
+            <a:r>
+              <a:rPr lang="en-US" dirty="0">
+                <a:solidFill>
+                  <a:schemeClr val="accent6"/>
+                </a:solidFill>
+              </a:rPr>
+              <a:t>Move the detector toward source/sample by </a:t>
+            </a:r>
+            <a:r>
+              <a:rPr lang="en-US" dirty="0" err="1">
+                <a:solidFill>
+                  <a:srgbClr val="FF0000"/>
+                </a:solidFill>
+              </a:rPr>
+              <a:t>swd</a:t>
+            </a:r>
+            <a:r>
+              <a:rPr lang="en-US" dirty="0">
+                <a:solidFill>
+                  <a:srgbClr val="FF0000"/>
+                </a:solidFill>
+              </a:rPr>
+              <a:t> - 71 mm</a:t>
+            </a:r>
+            <a:r>
+              <a:rPr lang="en-US" dirty="0">
+                <a:solidFill>
+                  <a:schemeClr val="accent6"/>
+                </a:solidFill>
+              </a:rPr>
+              <a:t> to (0, 0, </a:t>
+            </a:r>
+            <a:r>
+              <a:rPr lang="en-US" dirty="0" err="1">
+                <a:solidFill>
+                  <a:srgbClr val="FF0000"/>
+                </a:solidFill>
+              </a:rPr>
+              <a:t>sdd</a:t>
+            </a:r>
+            <a:r>
+              <a:rPr lang="en-US" dirty="0">
+                <a:solidFill>
+                  <a:srgbClr val="FF0000"/>
+                </a:solidFill>
+              </a:rPr>
+              <a:t> – </a:t>
+            </a:r>
+            <a:r>
+              <a:rPr lang="en-US" dirty="0" err="1">
+                <a:solidFill>
+                  <a:srgbClr val="FF0000"/>
+                </a:solidFill>
+              </a:rPr>
+              <a:t>swd</a:t>
+            </a:r>
+            <a:r>
+              <a:rPr lang="en-US" dirty="0">
+                <a:solidFill>
+                  <a:srgbClr val="FF0000"/>
+                </a:solidFill>
+              </a:rPr>
+              <a:t> + 0.071 meter</a:t>
+            </a:r>
+            <a:r>
+              <a:rPr lang="en-US" dirty="0">
+                <a:solidFill>
+                  <a:schemeClr val="accent6"/>
+                </a:solidFill>
+              </a:rPr>
+              <a:t>)</a:t>
+            </a:r>
+            <a:endParaRPr lang="en-US" b="1" dirty="0">
+              <a:solidFill>
+                <a:schemeClr val="accent6"/>
+              </a:solidFill>
+            </a:endParaRPr>
           </a:p>
           <a:p>
             <a:pPr marL="342900" indent="-342900">
               <a:buAutoNum type="arabicPeriod"/>
             </a:pPr>
             <a:r>
-              <a:rPr lang="en-US" dirty="0">
+              <a:rPr lang="en-US" b="1" dirty="0">
                 <a:solidFill>
                   <a:schemeClr val="accent6"/>
                 </a:solidFill>
               </a:rPr>
-              <a:t>Move the detector toward source/sample by </a:t>
-            </a:r>
-            <a:r>
-              <a:rPr lang="en-US" dirty="0" err="1">
-                <a:solidFill>
-                  <a:srgbClr val="FF0000"/>
-                </a:solidFill>
-              </a:rPr>
-              <a:t>swd</a:t>
-            </a:r>
-            <a:r>
-              <a:rPr lang="en-US" dirty="0">
-                <a:solidFill>
-                  <a:srgbClr val="FF0000"/>
-                </a:solidFill>
-              </a:rPr>
-              <a:t> - 71 mm</a:t>
-            </a:r>
-            <a:r>
-              <a:rPr lang="en-US" dirty="0">
-                <a:solidFill>
-                  <a:schemeClr val="accent6"/>
-                </a:solidFill>
-              </a:rPr>
-              <a:t> to (0, 0, </a:t>
-            </a:r>
-            <a:r>
-              <a:rPr lang="en-US" dirty="0" err="1">
-                <a:solidFill>
-                  <a:srgbClr val="FF0000"/>
-                </a:solidFill>
-              </a:rPr>
-              <a:t>sdd</a:t>
-            </a:r>
-            <a:r>
-              <a:rPr lang="en-US" dirty="0">
-                <a:solidFill>
-                  <a:srgbClr val="FF0000"/>
-                </a:solidFill>
-              </a:rPr>
-              <a:t> – </a:t>
-            </a:r>
-            <a:r>
-              <a:rPr lang="en-US" dirty="0" err="1">
-                <a:solidFill>
-                  <a:srgbClr val="FF0000"/>
-                </a:solidFill>
-              </a:rPr>
-              <a:t>swd</a:t>
-            </a:r>
-            <a:r>
-              <a:rPr lang="en-US" dirty="0">
-                <a:solidFill>
-                  <a:srgbClr val="FF0000"/>
-                </a:solidFill>
-              </a:rPr>
-              <a:t> + 0.071 meter</a:t>
-            </a:r>
-            <a:r>
-              <a:rPr lang="en-US" dirty="0">
-                <a:solidFill>
-                  <a:schemeClr val="accent6"/>
-                </a:solidFill>
-              </a:rPr>
-              <a:t>)</a:t>
+              <a:t>Re-calculate sample detector position in meta data</a:t>
             </a:r>
           </a:p>
           <a:p>
@@ -9038,7 +9168,7 @@
             </a:pPr>
             <a:r>
               <a:rPr lang="en-US" dirty="0"/>
-              <a:t>Center of silicon window is at (0, 0, -0.071) (unit is meter), </a:t>
+              <a:t>Center of silicon window is at (0, 0, 0.071) (unit is meter), </a:t>
             </a:r>
             <a:r>
               <a:rPr lang="en-US" dirty="0" err="1"/>
@@ -9735,6 +9865,38 @@
                   <a:srgbClr val="FF0000"/>
                 </a:solidFill>
               </a:rPr>
+              <a:t> + </a:t>
+            </a:r>
+            <a:r>
+              <a:rPr lang="en-US" i="1" dirty="0" err="1">
+                <a:solidFill>
+                  <a:srgbClr val="FF0000"/>
+                </a:solidFill>
+              </a:rPr>
+              <a:t>swd</a:t>
+            </a:r>
+            <a:r>
+              <a:rPr lang="en-US" i="1" dirty="0">
+                <a:solidFill>
+                  <a:srgbClr val="FF0000"/>
+                </a:solidFill>
+              </a:rPr>
+              <a:t>’ - </a:t>
+            </a:r>
+            <a:r>
+              <a:rPr lang="en-US" i="1" dirty="0" err="1">
+                <a:solidFill>
+                  <a:srgbClr val="FF0000"/>
+                </a:solidFill>
+              </a:rPr>
+              <a:t>swd</a:t>
+            </a:r>
+            <a:r>
+              <a:rPr lang="en-US" i="1" dirty="0">
+                <a:solidFill>
+                  <a:srgbClr val="FF0000"/>
+                </a:solidFill>
+              </a:rPr>
               <a:t>)</a:t>
             </a:r>
           </a:p>
@@ -11838,7 +12000,7 @@
                   <a:srgbClr val="FF0000"/>
                 </a:solidFill>
               </a:rPr>
-              <a:t>)</a:t>
+              <a:t>’)</a:t>
             </a:r>
           </a:p>
         </p:txBody>
@@ -12841,7 +13003,7 @@
         <p:spPr/>
         <p:txBody>
           <a:bodyPr>
-            <a:normAutofit fontScale="62500" lnSpcReduction="20000"/>
+            <a:normAutofit fontScale="47500" lnSpcReduction="20000"/>
           </a:bodyPr>
           <a:lstStyle/>
           <a:p>
@@ -12884,7 +13046,7 @@
           <a:p>
             <a:r>
               <a:rPr lang="en-US" dirty="0"/>
-              <a:t>Without any meta data overwriting</a:t>
+              <a:t>Test 1: Without any meta data overwriting</a:t>
             </a:r>
           </a:p>
           <a:p>
@@ -12911,14 +13073,14 @@
           <a:p>
             <a:r>
               <a:rPr lang="en-US" dirty="0"/>
-              <a:t>Overwrite sample to silicon window distance to 82.3 mm, i.e., shift 12.3 mm from position recorded by EPICS</a:t>
+              <a:t>Test 2: Overwrite sample to silicon window distance to 82.3 mm, i.e., shift 11.3 mm from position recorded by EPICS</a:t>
             </a:r>
           </a:p>
           <a:p>
             <a:pPr lvl="1"/>
             <a:r>
               <a:rPr lang="en-US" dirty="0"/>
-              <a:t>Sample is located at (0, 0, 0.0123)</a:t>
+              <a:t>Sample is located at (0, 0, -0.0113)</a:t>
             </a:r>
           </a:p>
           <a:p>
@@ -12932,13 +13094,45 @@
             <a:pPr lvl="1"/>
             <a:r>
               <a:rPr lang="en-US" dirty="0"/>
-              <a:t>Sample detector distance is 7.0123 m</a:t>
+              <a:t>Sample detector distance is 7.0113 m</a:t>
             </a:r>
           </a:p>
           <a:p>
             <a:r>
               <a:rPr lang="en-US" dirty="0"/>
-              <a:t>Overwrite sample to detector distance to 7.1234 m</a:t>
+              <a:t>Test 4: Overwrite sample to 200 mm and overwrite sample to detector distance 15.00 m such that SDD is not changed</a:t>
+            </a:r>
+          </a:p>
+          <a:p>
+            <a:pPr lvl="1"/>
+            <a:r>
+              <a:rPr lang="en-US" dirty="0"/>
+              <a:t>Sample is re-located to (0, 0, -0.129)</a:t>
+            </a:r>
+          </a:p>
+          <a:p>
+            <a:pPr lvl="1"/>
+            <a:r>
+              <a:rPr lang="en-US" dirty="0"/>
+              <a:t>Detector is re-located to (0, 0, 14.871)</a:t>
+            </a:r>
+          </a:p>
+          <a:p>
+            <a:pPr lvl="1"/>
+            <a:r>
+              <a:rPr lang="en-US" dirty="0"/>
+              <a:t>Sample detector distance is </a:t>
+            </a:r>
+            <a:r>
+              <a:rPr lang="en-US"/>
+              <a:t>15 meter</a:t>
+            </a:r>
+            <a:endParaRPr lang="en-US" dirty="0"/>
+          </a:p>
+          <a:p>
+            <a:r>
+              <a:rPr lang="en-US" dirty="0"/>
+              <a:t>Test 3: Overwrite sample to detector distance to 10 m</a:t>
             </a:r>
           </a:p>
           <a:p>
@@ -12952,20 +13146,18 @@
             <a:pPr lvl="1"/>
             <a:r>
               <a:rPr lang="en-US" dirty="0"/>
-              <a:t>Detector is located at (0, 0, 7.1234)</a:t>
+              <a:t>Detector is re-located to (0, 0, 10)</a:t>
             </a:r>
           </a:p>
           <a:p>
             <a:pPr lvl="1"/>
             <a:r>
               <a:rPr lang="en-US" dirty="0"/>
-              <a:t>Sample detector distance is 7.1234 m</a:t>
-            </a:r>
-          </a:p>
-          <a:p>
-            <a:pPr marL="457200" lvl="1" indent="0">
-              <a:buNone/>
-            </a:pPr>
+              <a:t>Sample detector distance is then 10 m</a:t>
+            </a:r>
+          </a:p>
+          <a:p>
+            <a:pPr lvl="1"/>
             <a:endParaRPr lang="en-US" dirty="0"/>
           </a:p>
         </p:txBody>

</xml_diff>

<commit_message>
Refs #435. Modified doc.
Former-commit-id: 90cd53359c9ccee59fe46e74d64e999b8fd1a107
</commit_message>
<xml_diff>
--- a/documents/mono_sample_det_pos.pptx
+++ b/documents/mono_sample_det_pos.pptx
@@ -12979,7 +12979,7 @@
           <a:p>
             <a:r>
               <a:rPr lang="en-US" dirty="0"/>
-              <a:t>Example</a:t>
+              <a:t>Test Case</a:t>
             </a:r>
           </a:p>
         </p:txBody>
@@ -13011,9 +13011,9 @@
               <a:rPr lang="en-US" dirty="0"/>
               <a:t>Data:</a:t>
             </a:r>
-            <a:br>
-              <a:rPr lang="en-US" dirty="0"/>
-            </a:br>
+          </a:p>
+          <a:p>
+            <a:pPr lvl="1"/>
             <a:r>
               <a:rPr lang="en-US" dirty="0"/>
               <a:t>/HFIR/CG3/IPTS-23782/nexus/CG3_4829.nxs.h5</a:t>
@@ -13100,6 +13100,33 @@
           <a:p>
             <a:r>
               <a:rPr lang="en-US" dirty="0"/>
+              <a:t>Test 3: Overwrite sample to detector distance to 10 m</a:t>
+            </a:r>
+          </a:p>
+          <a:p>
+            <a:pPr lvl="1"/>
+            <a:r>
+              <a:rPr lang="en-US" dirty="0"/>
+              <a:t>Sample is located at (0, 0, 0)</a:t>
+            </a:r>
+          </a:p>
+          <a:p>
+            <a:pPr lvl="1"/>
+            <a:r>
+              <a:rPr lang="en-US" dirty="0"/>
+              <a:t>Detector is re-located to (0, 0, 10)</a:t>
+            </a:r>
+          </a:p>
+          <a:p>
+            <a:pPr lvl="1"/>
+            <a:r>
+              <a:rPr lang="en-US" dirty="0"/>
+              <a:t>Sample detector distance is then 10 m</a:t>
+            </a:r>
+          </a:p>
+          <a:p>
+            <a:r>
+              <a:rPr lang="en-US" dirty="0"/>
               <a:t>Test 4: Overwrite sample to 200 mm and overwrite sample to detector distance 15.00 m such that SDD is not changed</a:t>
             </a:r>
           </a:p>
@@ -13121,40 +13148,12 @@
             <a:pPr lvl="1"/>
             <a:r>
               <a:rPr lang="en-US" dirty="0"/>
-              <a:t>Sample detector distance is </a:t>
-            </a:r>
-            <a:r>
-              <a:rPr lang="en-US"/>
-              <a:t>15 meter</a:t>
-            </a:r>
+              <a:t>Sample detector distance is 15 meter</a:t>
+            </a:r>
+          </a:p>
+          <a:p>
+            <a:pPr lvl="1"/>
             <a:endParaRPr lang="en-US" dirty="0"/>
-          </a:p>
-          <a:p>
-            <a:r>
-              <a:rPr lang="en-US" dirty="0"/>
-              <a:t>Test 3: Overwrite sample to detector distance to 10 m</a:t>
-            </a:r>
-          </a:p>
-          <a:p>
-            <a:pPr lvl="1"/>
-            <a:r>
-              <a:rPr lang="en-US" dirty="0"/>
-              <a:t>Sample is located at (0, 0, 0)</a:t>
-            </a:r>
-          </a:p>
-          <a:p>
-            <a:pPr lvl="1"/>
-            <a:r>
-              <a:rPr lang="en-US" dirty="0"/>
-              <a:t>Detector is re-located to (0, 0, 10)</a:t>
-            </a:r>
-          </a:p>
-          <a:p>
-            <a:pPr lvl="1"/>
-            <a:r>
-              <a:rPr lang="en-US" dirty="0"/>
-              <a:t>Sample detector distance is then 10 m</a:t>
-            </a:r>
           </a:p>
           <a:p>
             <a:pPr lvl="1"/>

</xml_diff>

<commit_message>
Refs #435. Modified slides for GPSANS demo.
Former-commit-id: d3bcfe5ad698c9a128548c3b7431ceb5026fa135
</commit_message>
<xml_diff>
--- a/documents/mono_sample_det_pos.pptx
+++ b/documents/mono_sample_det_pos.pptx
@@ -15,7 +15,7 @@
     <p:sldId id="261" r:id="rId9"/>
     <p:sldId id="265" r:id="rId10"/>
     <p:sldId id="266" r:id="rId11"/>
-    <p:sldId id="277" r:id="rId12"/>
+    <p:sldId id="279" r:id="rId12"/>
     <p:sldId id="257" r:id="rId13"/>
     <p:sldId id="267" r:id="rId14"/>
     <p:sldId id="269" r:id="rId15"/>
@@ -3614,7 +3614,7 @@
           <a:p>
             <a:r>
               <a:rPr lang="en-US" dirty="0"/>
-              <a:t>Example</a:t>
+              <a:t>Test Case</a:t>
             </a:r>
           </a:p>
         </p:txBody>
@@ -3638,7 +3638,7 @@
         <p:spPr/>
         <p:txBody>
           <a:bodyPr>
-            <a:normAutofit fontScale="62500" lnSpcReduction="20000"/>
+            <a:normAutofit fontScale="47500" lnSpcReduction="20000"/>
           </a:bodyPr>
           <a:lstStyle/>
           <a:p>
@@ -3646,12 +3646,12 @@
               <a:rPr lang="en-US" dirty="0"/>
               <a:t>Data:</a:t>
             </a:r>
-            <a:br>
+          </a:p>
+          <a:p>
+            <a:pPr lvl="1"/>
+            <a:r>
               <a:rPr lang="en-US" dirty="0"/>
-            </a:br>
-            <a:r>
-              <a:rPr lang="en-US" dirty="0"/>
-              <a:t>/HFIR/CG2/IPTS-23801/nexus/CG2_7116.nxs.h5 </a:t>
+              <a:t>/HFIR/CG2/IPTS-23801/nexus/CG2_7116.nxs.h5</a:t>
             </a:r>
           </a:p>
           <a:p>
@@ -3664,7 +3664,7 @@
             <a:pPr lvl="1"/>
             <a:r>
               <a:rPr lang="en-US" dirty="0"/>
-              <a:t>CG2:CS:SampleToSi = 88 mm</a:t>
+              <a:t>CG2:CS:SampleToSi = 88 mm = 0.088 m</a:t>
             </a:r>
           </a:p>
           <a:p>
@@ -3675,13 +3675,91 @@
             </a:r>
             <a:r>
               <a:rPr lang="en-US" dirty="0"/>
-              <a:t> = 6.88799993 m</a:t>
+              <a:t> = 6.888 m</a:t>
             </a:r>
           </a:p>
           <a:p>
             <a:r>
               <a:rPr lang="en-US" dirty="0"/>
-              <a:t>Without any meta data overwriting</a:t>
+              <a:t>Test 1: Without any meta data overwriting</a:t>
+            </a:r>
+          </a:p>
+          <a:p>
+            <a:pPr lvl="1"/>
+            <a:r>
+              <a:rPr lang="en-US" dirty="0"/>
+              <a:t>Sample is located at (0, -0.088, 0)</a:t>
+            </a:r>
+          </a:p>
+          <a:p>
+            <a:pPr lvl="1"/>
+            <a:r>
+              <a:rPr lang="en-US" dirty="0"/>
+              <a:t>Detector is located at (0, 0, 6.800)</a:t>
+            </a:r>
+          </a:p>
+          <a:p>
+            <a:pPr lvl="1"/>
+            <a:r>
+              <a:rPr lang="en-US" dirty="0"/>
+              <a:t>Sample detector distance is </a:t>
+            </a:r>
+            <a:r>
+              <a:rPr lang="en-US" dirty="0">
+                <a:solidFill>
+                  <a:srgbClr val="FF0000"/>
+                </a:solidFill>
+              </a:rPr>
+              <a:t>6.888</a:t>
+            </a:r>
+            <a:r>
+              <a:rPr lang="en-US" dirty="0"/>
+              <a:t> m</a:t>
+            </a:r>
+          </a:p>
+          <a:p>
+            <a:r>
+              <a:rPr lang="en-US" dirty="0"/>
+              <a:t>Test 2: Overwrite sample to silicon window distance to 99 mm, i.e., shift 11 mm from position recorded by EPICS</a:t>
+            </a:r>
+          </a:p>
+          <a:p>
+            <a:pPr lvl="1"/>
+            <a:r>
+              <a:rPr lang="en-US" dirty="0"/>
+              <a:t>Sample is located at (0, 0, -0.099)</a:t>
+            </a:r>
+          </a:p>
+          <a:p>
+            <a:pPr lvl="1"/>
+            <a:r>
+              <a:rPr lang="en-US" dirty="0"/>
+              <a:t>Detector is located at (0, 0, 6.800)</a:t>
+            </a:r>
+          </a:p>
+          <a:p>
+            <a:pPr lvl="1"/>
+            <a:r>
+              <a:rPr lang="en-US" dirty="0"/>
+              <a:t>Sample detector distance is </a:t>
+            </a:r>
+            <a:r>
+              <a:rPr lang="en-US" dirty="0">
+                <a:solidFill>
+                  <a:srgbClr val="FF0000"/>
+                </a:solidFill>
+              </a:rPr>
+              <a:t>6.899</a:t>
+            </a:r>
+            <a:r>
+              <a:rPr lang="en-US" dirty="0"/>
+              <a:t> m</a:t>
+            </a:r>
+          </a:p>
+          <a:p>
+            <a:r>
+              <a:rPr lang="en-US" dirty="0"/>
+              <a:t>Test 3: Overwrite sample to detector distance to 10 m.</a:t>
             </a:r>
           </a:p>
           <a:p>
@@ -3695,76 +3773,69 @@
             <a:pPr lvl="1"/>
             <a:r>
               <a:rPr lang="en-US" dirty="0"/>
-              <a:t>Detector is located at (0, 0, 6.800)</a:t>
+              <a:t>Detector is re-located to (0, 0, 9.912)</a:t>
             </a:r>
           </a:p>
           <a:p>
             <a:pPr lvl="1"/>
             <a:r>
               <a:rPr lang="en-US" dirty="0"/>
-              <a:t>Sample detector distance is 6.888 m</a:t>
+              <a:t>Sample detector distance is then 10 m</a:t>
             </a:r>
           </a:p>
           <a:p>
             <a:r>
               <a:rPr lang="en-US" dirty="0"/>
-              <a:t>Overwrite sample to silicon window distance to 0 mm</a:t>
+              <a:t>Test 4: Overwrite sample to 200 mm and overwrite sample to detector distance 15.00 m such that SDD is not changed</a:t>
             </a:r>
           </a:p>
           <a:p>
             <a:pPr lvl="1"/>
             <a:r>
               <a:rPr lang="en-US" dirty="0"/>
-              <a:t>Sample is located at (0, 0, 0)</a:t>
+              <a:t>Sample is re-located to (0, 0, 0.200)</a:t>
             </a:r>
           </a:p>
           <a:p>
             <a:pPr lvl="1"/>
             <a:r>
               <a:rPr lang="en-US" dirty="0"/>
-              <a:t>Detector is located at (0, 0, 6.800)</a:t>
+              <a:t>Detector is re-located to (0, 0, 14.800)</a:t>
             </a:r>
           </a:p>
           <a:p>
             <a:pPr lvl="1"/>
             <a:r>
               <a:rPr lang="en-US" dirty="0"/>
-              <a:t>Sample detector distance is 6.800 m</a:t>
-            </a:r>
-          </a:p>
-          <a:p>
+              <a:t>Sample detector distance is </a:t>
+            </a:r>
+            <a:r>
+              <a:rPr lang="en-US" dirty="0">
+                <a:solidFill>
+                  <a:srgbClr val="FF0000"/>
+                </a:solidFill>
+              </a:rPr>
+              <a:t>15.000</a:t>
+            </a:r>
             <a:r>
               <a:rPr lang="en-US" dirty="0"/>
-              <a:t>Overwrite sample to detector is distance to 60.888 m</a:t>
+              <a:t> meter</a:t>
             </a:r>
           </a:p>
           <a:p>
             <a:pPr lvl="1"/>
-            <a:r>
-              <a:rPr lang="en-US" dirty="0"/>
-              <a:t>Sample is located at (0, 0, -0.088)</a:t>
-            </a:r>
+            <a:endParaRPr lang="en-US" dirty="0"/>
           </a:p>
           <a:p>
             <a:pPr lvl="1"/>
-            <a:r>
-              <a:rPr lang="en-US" dirty="0"/>
-              <a:t>Detector is located at (0, 0, 60.800)</a:t>
-            </a:r>
-          </a:p>
-          <a:p>
-            <a:pPr lvl="1"/>
-            <a:r>
-              <a:rPr lang="en-US" dirty="0"/>
-              <a:t>Sample detector distance is 60.888 m</a:t>
-            </a:r>
+            <a:endParaRPr lang="en-US" dirty="0"/>
           </a:p>
         </p:txBody>
       </p:sp>
     </p:spTree>
     <p:extLst>
       <p:ext uri="{BB962C8B-B14F-4D97-AF65-F5344CB8AC3E}">
-        <p14:creationId xmlns:p14="http://schemas.microsoft.com/office/powerpoint/2010/main" val="2738720975"/>
+        <p14:creationId xmlns:p14="http://schemas.microsoft.com/office/powerpoint/2010/main" val="2328180834"/>
       </p:ext>
     </p:extLst>
   </p:cSld>

</xml_diff>

<commit_message>
Refs #435. Fixed an issue to write SampleToSi log.
Former-commit-id: 3dd3fe9222fc8fc0a3a064815668acb33dde87a7
</commit_message>
<xml_diff>
--- a/documents/mono_sample_det_pos.pptx
+++ b/documents/mono_sample_det_pos.pptx
@@ -3688,8 +3688,13 @@
             <a:pPr lvl="1"/>
             <a:r>
               <a:rPr lang="en-US" dirty="0"/>
-              <a:t>Sample is located at (0, -0.088, 0)</a:t>
-            </a:r>
+              <a:t>Sample is located at (0</a:t>
+            </a:r>
+            <a:r>
+              <a:rPr lang="en-US"/>
+              <a:t>, 0, 0-0.088)</a:t>
+            </a:r>
+            <a:endParaRPr lang="en-US" dirty="0"/>
           </a:p>
           <a:p>
             <a:pPr lvl="1"/>
@@ -3780,7 +3785,19 @@
             <a:pPr lvl="1"/>
             <a:r>
               <a:rPr lang="en-US" dirty="0"/>
-              <a:t>Sample detector distance is then 10 m</a:t>
+              <a:t>Sample detector distance is then </a:t>
+            </a:r>
+            <a:r>
+              <a:rPr lang="en-US" dirty="0">
+                <a:solidFill>
+                  <a:srgbClr val="FF0000"/>
+                </a:solidFill>
+              </a:rPr>
+              <a:t>10</a:t>
+            </a:r>
+            <a:r>
+              <a:rPr lang="en-US" dirty="0"/>
+              <a:t> m</a:t>
             </a:r>
           </a:p>
           <a:p>

</xml_diff>